<commit_message>
Editing the TS usage document
</commit_message>
<xml_diff>
--- a/TS_basics/TypeScript_usage_understood.pptx
+++ b/TS_basics/TypeScript_usage_understood.pptx
@@ -5,7 +5,7 @@
     <p:sldMasterId id="2147483648" r:id="rId4"/>
   </p:sldMasterIdLst>
   <p:notesMasterIdLst>
-    <p:notesMasterId r:id="rId20"/>
+    <p:notesMasterId r:id="rId22"/>
   </p:notesMasterIdLst>
   <p:sldIdLst>
     <p:sldId id="256" r:id="rId5"/>
@@ -19,10 +19,12 @@
     <p:sldId id="277" r:id="rId13"/>
     <p:sldId id="278" r:id="rId14"/>
     <p:sldId id="287" r:id="rId15"/>
-    <p:sldId id="281" r:id="rId16"/>
-    <p:sldId id="288" r:id="rId17"/>
-    <p:sldId id="283" r:id="rId18"/>
-    <p:sldId id="284" r:id="rId19"/>
+    <p:sldId id="290" r:id="rId16"/>
+    <p:sldId id="291" r:id="rId17"/>
+    <p:sldId id="281" r:id="rId18"/>
+    <p:sldId id="288" r:id="rId19"/>
+    <p:sldId id="283" r:id="rId20"/>
+    <p:sldId id="284" r:id="rId21"/>
   </p:sldIdLst>
   <p:sldSz cx="12192000" cy="6858000"/>
   <p:notesSz cx="6858000" cy="9144000"/>
@@ -1205,7 +1207,7 @@
           <a:p>
             <a:fld id="{5645C365-1C26-6946-87AF-75D6A7DF4277}" type="datetimeFigureOut">
               <a:rPr lang="en-GB" smtClean="0"/>
-              <a:t>03/10/2024</a:t>
+              <a:t>10/02/2025</a:t>
             </a:fld>
             <a:endParaRPr lang="en-GB"/>
           </a:p>
@@ -1704,7 +1706,7 @@
           <a:p>
             <a:fld id="{35B864B8-8D08-7B43-B4FB-B2FB41A5D9E3}" type="datetime1">
               <a:rPr lang="fi-FI" smtClean="0"/>
-              <a:t>3.10.2024</a:t>
+              <a:t>10.2.2025</a:t>
             </a:fld>
             <a:endParaRPr lang="en-GB" dirty="0"/>
           </a:p>
@@ -2031,7 +2033,7 @@
           <a:p>
             <a:fld id="{D5AEA85A-FC56-D34C-9AA6-ECC3D2586F37}" type="datetime1">
               <a:rPr lang="fi-FI" smtClean="0"/>
-              <a:t>3.10.2024</a:t>
+              <a:t>10.2.2025</a:t>
             </a:fld>
             <a:endParaRPr lang="en-GB" dirty="0"/>
           </a:p>
@@ -2241,7 +2243,7 @@
           <a:p>
             <a:fld id="{E6BC6EEF-E660-7844-8930-418AFF95EA40}" type="datetime1">
               <a:rPr lang="fi-FI" smtClean="0"/>
-              <a:t>3.10.2024</a:t>
+              <a:t>10.2.2025</a:t>
             </a:fld>
             <a:endParaRPr lang="en-GB" dirty="0"/>
           </a:p>
@@ -2550,7 +2552,7 @@
           <a:p>
             <a:fld id="{4E10C7EC-C1C1-9849-A573-7692478FCD52}" type="datetime1">
               <a:rPr lang="fi-FI" smtClean="0"/>
-              <a:t>3.10.2024</a:t>
+              <a:t>10.2.2025</a:t>
             </a:fld>
             <a:endParaRPr lang="en-GB" dirty="0"/>
           </a:p>
@@ -2823,7 +2825,7 @@
           <a:p>
             <a:fld id="{844FF3FE-30BE-2040-9151-6FBC4992BF4F}" type="datetime1">
               <a:rPr lang="fi-FI" smtClean="0"/>
-              <a:t>3.10.2024</a:t>
+              <a:t>10.2.2025</a:t>
             </a:fld>
             <a:endParaRPr lang="en-GB" dirty="0"/>
           </a:p>
@@ -3063,7 +3065,7 @@
           <a:p>
             <a:fld id="{11EDCD7B-6966-E249-89F2-D46BDFBF56BE}" type="datetime1">
               <a:rPr lang="fi-FI" smtClean="0"/>
-              <a:t>3.10.2024</a:t>
+              <a:t>10.2.2025</a:t>
             </a:fld>
             <a:endParaRPr lang="en-GB" dirty="0"/>
           </a:p>
@@ -3356,7 +3358,7 @@
           <a:p>
             <a:fld id="{11EDCD7B-6966-E249-89F2-D46BDFBF56BE}" type="datetime1">
               <a:rPr lang="fi-FI" smtClean="0"/>
-              <a:t>3.10.2024</a:t>
+              <a:t>10.2.2025</a:t>
             </a:fld>
             <a:endParaRPr lang="en-GB" dirty="0"/>
           </a:p>
@@ -3795,7 +3797,7 @@
           <a:p>
             <a:fld id="{844FF3FE-30BE-2040-9151-6FBC4992BF4F}" type="datetime1">
               <a:rPr lang="fi-FI" smtClean="0"/>
-              <a:t>3.10.2024</a:t>
+              <a:t>10.2.2025</a:t>
             </a:fld>
             <a:endParaRPr lang="en-GB" dirty="0"/>
           </a:p>
@@ -4023,7 +4025,7 @@
           <a:p>
             <a:fld id="{11EDCD7B-6966-E249-89F2-D46BDFBF56BE}" type="datetime1">
               <a:rPr lang="fi-FI" smtClean="0"/>
-              <a:t>3.10.2024</a:t>
+              <a:t>10.2.2025</a:t>
             </a:fld>
             <a:endParaRPr lang="en-GB" dirty="0"/>
           </a:p>
@@ -4438,7 +4440,7 @@
           <a:p>
             <a:fld id="{B62E192A-D52B-F541-B2AA-4AEB9388F1F7}" type="datetime1">
               <a:rPr lang="fi-FI" smtClean="0"/>
-              <a:t>3.10.2024</a:t>
+              <a:t>10.2.2025</a:t>
             </a:fld>
             <a:endParaRPr lang="en-GB" dirty="0"/>
           </a:p>
@@ -4738,7 +4740,7 @@
           <a:p>
             <a:fld id="{EEA4FAA2-2B3E-264C-A42F-2D6D3EF33A3C}" type="datetime1">
               <a:rPr lang="fi-FI" smtClean="0"/>
-              <a:t>3.10.2024</a:t>
+              <a:t>10.2.2025</a:t>
             </a:fld>
             <a:endParaRPr lang="en-GB" dirty="0"/>
           </a:p>
@@ -5641,7 +5643,7 @@
           <a:p>
             <a:fld id="{B3114A65-8017-1743-A85A-B2A4BB835AE9}" type="datetime1">
               <a:rPr lang="fi-FI" smtClean="0"/>
-              <a:t>3.10.2024</a:t>
+              <a:t>10.2.2025</a:t>
             </a:fld>
             <a:endParaRPr lang="en-GB" dirty="0"/>
           </a:p>
@@ -5869,7 +5871,7 @@
           <a:p>
             <a:fld id="{11EDCD7B-6966-E249-89F2-D46BDFBF56BE}" type="datetime1">
               <a:rPr lang="fi-FI" smtClean="0"/>
-              <a:t>3.10.2024</a:t>
+              <a:t>10.2.2025</a:t>
             </a:fld>
             <a:endParaRPr lang="en-GB" dirty="0"/>
           </a:p>
@@ -6161,7 +6163,7 @@
           <a:p>
             <a:fld id="{45F98643-D206-614D-B596-3C8548138211}" type="datetime1">
               <a:rPr lang="fi-FI" smtClean="0"/>
-              <a:t>3.10.2024</a:t>
+              <a:t>10.2.2025</a:t>
             </a:fld>
             <a:endParaRPr lang="en-GB" dirty="0"/>
           </a:p>
@@ -6801,7 +6803,7 @@
           <a:p>
             <a:fld id="{30BF63A1-919F-FB49-ABA8-182126D24C50}" type="datetime1">
               <a:rPr lang="fi-FI" smtClean="0"/>
-              <a:t>3.10.2024</a:t>
+              <a:t>10.2.2025</a:t>
             </a:fld>
             <a:endParaRPr lang="en-GB" dirty="0"/>
           </a:p>
@@ -6965,7 +6967,7 @@
           <a:p>
             <a:fld id="{202E1EC2-47B8-044B-A09E-6A63B4D80C87}" type="datetime1">
               <a:rPr lang="fi-FI" smtClean="0"/>
-              <a:t>3.10.2024</a:t>
+              <a:t>10.2.2025</a:t>
             </a:fld>
             <a:endParaRPr lang="en-GB"/>
           </a:p>
@@ -7216,7 +7218,7 @@
           <a:p>
             <a:fld id="{202E1EC2-47B8-044B-A09E-6A63B4D80C87}" type="datetime1">
               <a:rPr lang="fi-FI" smtClean="0"/>
-              <a:t>3.10.2024</a:t>
+              <a:t>10.2.2025</a:t>
             </a:fld>
             <a:endParaRPr lang="en-GB"/>
           </a:p>
@@ -7294,6 +7296,386 @@
   <p:cSld>
     <p:spTree>
       <p:nvGrpSpPr>
+        <p:cNvPr id="1" name="">
+          <a:extLst>
+            <a:ext uri="{FF2B5EF4-FFF2-40B4-BE49-F238E27FC236}">
+              <a16:creationId xmlns:a16="http://schemas.microsoft.com/office/drawing/2014/main" id="{2A4B2CE5-EB26-26CC-3F57-4441B90E441D}"/>
+            </a:ext>
+          </a:extLst>
+        </p:cNvPr>
+        <p:cNvGrpSpPr/>
+        <p:nvPr/>
+      </p:nvGrpSpPr>
+      <p:grpSpPr>
+        <a:xfrm>
+          <a:off x="0" y="0"/>
+          <a:ext cx="0" cy="0"/>
+          <a:chOff x="0" y="0"/>
+          <a:chExt cx="0" cy="0"/>
+        </a:xfrm>
+      </p:grpSpPr>
+      <p:sp>
+        <p:nvSpPr>
+          <p:cNvPr id="8" name="Title 7">
+            <a:extLst>
+              <a:ext uri="{FF2B5EF4-FFF2-40B4-BE49-F238E27FC236}">
+                <a16:creationId xmlns:a16="http://schemas.microsoft.com/office/drawing/2014/main" id="{91614063-71A7-E2F0-36A4-D943DFD7E5D9}"/>
+              </a:ext>
+            </a:extLst>
+          </p:cNvPr>
+          <p:cNvSpPr>
+            <a:spLocks noGrp="1"/>
+          </p:cNvSpPr>
+          <p:nvPr>
+            <p:ph type="title"/>
+          </p:nvPr>
+        </p:nvSpPr>
+        <p:spPr/>
+        <p:txBody>
+          <a:bodyPr/>
+          <a:lstStyle/>
+          <a:p>
+            <a:pPr lvl="0"/>
+            <a:r>
+              <a:rPr lang="en-US" dirty="0"/>
+              <a:t>E.g. create your own complex datatypes with ‘interface’</a:t>
+            </a:r>
+            <a:endParaRPr lang="fi-FI" dirty="0"/>
+          </a:p>
+        </p:txBody>
+      </p:sp>
+      <p:sp>
+        <p:nvSpPr>
+          <p:cNvPr id="9" name="Content Placeholder 8">
+            <a:extLst>
+              <a:ext uri="{FF2B5EF4-FFF2-40B4-BE49-F238E27FC236}">
+                <a16:creationId xmlns:a16="http://schemas.microsoft.com/office/drawing/2014/main" id="{C6ABC41D-9B81-67AE-E284-B78D40E1BBD8}"/>
+              </a:ext>
+            </a:extLst>
+          </p:cNvPr>
+          <p:cNvSpPr>
+            <a:spLocks noGrp="1"/>
+          </p:cNvSpPr>
+          <p:nvPr>
+            <p:ph sz="half" idx="2"/>
+          </p:nvPr>
+        </p:nvSpPr>
+        <p:spPr>
+          <a:xfrm>
+            <a:off x="550864" y="1773238"/>
+            <a:ext cx="11125198" cy="4281334"/>
+          </a:xfrm>
+        </p:spPr>
+        <p:txBody>
+          <a:bodyPr>
+            <a:normAutofit/>
+          </a:bodyPr>
+          <a:lstStyle/>
+          <a:p>
+            <a:r>
+              <a:rPr lang="en-US" dirty="0"/>
+              <a:t>So that those types can be used in code as types</a:t>
+            </a:r>
+          </a:p>
+          <a:p>
+            <a:r>
+              <a:rPr lang="en-US" dirty="0"/>
+              <a:t>‘interface’ is better option than ‘type’ as interface can be extended to create more subtypes</a:t>
+            </a:r>
+          </a:p>
+        </p:txBody>
+      </p:sp>
+      <p:sp>
+        <p:nvSpPr>
+          <p:cNvPr id="5" name="Date Placeholder 4">
+            <a:extLst>
+              <a:ext uri="{FF2B5EF4-FFF2-40B4-BE49-F238E27FC236}">
+                <a16:creationId xmlns:a16="http://schemas.microsoft.com/office/drawing/2014/main" id="{9AE58D0D-F6E8-D5F8-CBBF-CAF315D1FB59}"/>
+              </a:ext>
+            </a:extLst>
+          </p:cNvPr>
+          <p:cNvSpPr>
+            <a:spLocks noGrp="1"/>
+          </p:cNvSpPr>
+          <p:nvPr>
+            <p:ph type="dt" sz="half" idx="10"/>
+          </p:nvPr>
+        </p:nvSpPr>
+        <p:spPr/>
+        <p:txBody>
+          <a:bodyPr/>
+          <a:lstStyle/>
+          <a:p>
+            <a:fld id="{202E1EC2-47B8-044B-A09E-6A63B4D80C87}" type="datetime1">
+              <a:rPr lang="fi-FI" smtClean="0"/>
+              <a:t>10.2.2025</a:t>
+            </a:fld>
+            <a:endParaRPr lang="en-GB"/>
+          </a:p>
+        </p:txBody>
+      </p:sp>
+      <p:sp>
+        <p:nvSpPr>
+          <p:cNvPr id="6" name="Footer Placeholder 5">
+            <a:extLst>
+              <a:ext uri="{FF2B5EF4-FFF2-40B4-BE49-F238E27FC236}">
+                <a16:creationId xmlns:a16="http://schemas.microsoft.com/office/drawing/2014/main" id="{04ED4C42-FC03-B025-2E58-F8E1BCBE932D}"/>
+              </a:ext>
+            </a:extLst>
+          </p:cNvPr>
+          <p:cNvSpPr>
+            <a:spLocks noGrp="1"/>
+          </p:cNvSpPr>
+          <p:nvPr>
+            <p:ph type="ftr" sz="quarter" idx="11"/>
+          </p:nvPr>
+        </p:nvSpPr>
+        <p:spPr/>
+        <p:txBody>
+          <a:bodyPr/>
+          <a:lstStyle/>
+          <a:p>
+            <a:endParaRPr lang="en-GB"/>
+          </a:p>
+        </p:txBody>
+      </p:sp>
+      <p:sp>
+        <p:nvSpPr>
+          <p:cNvPr id="7" name="Slide Number Placeholder 6">
+            <a:extLst>
+              <a:ext uri="{FF2B5EF4-FFF2-40B4-BE49-F238E27FC236}">
+                <a16:creationId xmlns:a16="http://schemas.microsoft.com/office/drawing/2014/main" id="{1D748540-6A96-78EB-1A0C-D5FF5A5F33B5}"/>
+              </a:ext>
+            </a:extLst>
+          </p:cNvPr>
+          <p:cNvSpPr>
+            <a:spLocks noGrp="1"/>
+          </p:cNvSpPr>
+          <p:nvPr>
+            <p:ph type="sldNum" sz="quarter" idx="12"/>
+          </p:nvPr>
+        </p:nvSpPr>
+        <p:spPr/>
+        <p:txBody>
+          <a:bodyPr/>
+          <a:lstStyle/>
+          <a:p>
+            <a:fld id="{76BAB7ED-EDE9-4D4B-9A2D-30E18C47C16E}" type="slidenum">
+              <a:rPr lang="en-GB" smtClean="0"/>
+              <a:t>12</a:t>
+            </a:fld>
+            <a:endParaRPr lang="en-GB"/>
+          </a:p>
+        </p:txBody>
+      </p:sp>
+    </p:spTree>
+    <p:extLst>
+      <p:ext uri="{BB962C8B-B14F-4D97-AF65-F5344CB8AC3E}">
+        <p14:creationId xmlns:p14="http://schemas.microsoft.com/office/powerpoint/2010/main" val="3078463348"/>
+      </p:ext>
+    </p:extLst>
+  </p:cSld>
+  <p:clrMapOvr>
+    <a:masterClrMapping/>
+  </p:clrMapOvr>
+</p:sld>
+</file>
+
+<file path=ppt/slides/slide13.xml><?xml version="1.0" encoding="utf-8"?>
+<p:sld xmlns:a="http://schemas.openxmlformats.org/drawingml/2006/main" xmlns:r="http://schemas.openxmlformats.org/officeDocument/2006/relationships" xmlns:p="http://schemas.openxmlformats.org/presentationml/2006/main">
+  <p:cSld>
+    <p:spTree>
+      <p:nvGrpSpPr>
+        <p:cNvPr id="1" name="">
+          <a:extLst>
+            <a:ext uri="{FF2B5EF4-FFF2-40B4-BE49-F238E27FC236}">
+              <a16:creationId xmlns:a16="http://schemas.microsoft.com/office/drawing/2014/main" id="{0E347919-7B2C-163D-D8D7-99E6C358B795}"/>
+            </a:ext>
+          </a:extLst>
+        </p:cNvPr>
+        <p:cNvGrpSpPr/>
+        <p:nvPr/>
+      </p:nvGrpSpPr>
+      <p:grpSpPr>
+        <a:xfrm>
+          <a:off x="0" y="0"/>
+          <a:ext cx="0" cy="0"/>
+          <a:chOff x="0" y="0"/>
+          <a:chExt cx="0" cy="0"/>
+        </a:xfrm>
+      </p:grpSpPr>
+      <p:sp>
+        <p:nvSpPr>
+          <p:cNvPr id="8" name="Title 7">
+            <a:extLst>
+              <a:ext uri="{FF2B5EF4-FFF2-40B4-BE49-F238E27FC236}">
+                <a16:creationId xmlns:a16="http://schemas.microsoft.com/office/drawing/2014/main" id="{6A51F12C-2628-E7E5-2D47-30A9A5BABECE}"/>
+              </a:ext>
+            </a:extLst>
+          </p:cNvPr>
+          <p:cNvSpPr>
+            <a:spLocks noGrp="1"/>
+          </p:cNvSpPr>
+          <p:nvPr>
+            <p:ph type="title"/>
+          </p:nvPr>
+        </p:nvSpPr>
+        <p:spPr/>
+        <p:txBody>
+          <a:bodyPr/>
+          <a:lstStyle/>
+          <a:p>
+            <a:pPr lvl="0"/>
+            <a:r>
+              <a:rPr lang="en-US" dirty="0"/>
+              <a:t>Take into use new versions of libraries, and their @-type modules</a:t>
+            </a:r>
+            <a:endParaRPr lang="fi-FI" dirty="0"/>
+          </a:p>
+        </p:txBody>
+      </p:sp>
+      <p:sp>
+        <p:nvSpPr>
+          <p:cNvPr id="9" name="Content Placeholder 8">
+            <a:extLst>
+              <a:ext uri="{FF2B5EF4-FFF2-40B4-BE49-F238E27FC236}">
+                <a16:creationId xmlns:a16="http://schemas.microsoft.com/office/drawing/2014/main" id="{C8416404-D8A2-E8A8-324D-4B941C70B52A}"/>
+              </a:ext>
+            </a:extLst>
+          </p:cNvPr>
+          <p:cNvSpPr>
+            <a:spLocks noGrp="1"/>
+          </p:cNvSpPr>
+          <p:nvPr>
+            <p:ph sz="half" idx="2"/>
+          </p:nvPr>
+        </p:nvSpPr>
+        <p:spPr>
+          <a:xfrm>
+            <a:off x="550864" y="1773238"/>
+            <a:ext cx="11125198" cy="4281334"/>
+          </a:xfrm>
+        </p:spPr>
+        <p:txBody>
+          <a:bodyPr>
+            <a:normAutofit/>
+          </a:bodyPr>
+          <a:lstStyle/>
+          <a:p>
+            <a:r>
+              <a:rPr lang="en-US" dirty="0"/>
+              <a:t>Then your code that uses and calls the library code will be also valid TypeScript, </a:t>
+            </a:r>
+          </a:p>
+          <a:p>
+            <a:r>
+              <a:rPr lang="en-US" dirty="0"/>
+              <a:t>as the types imported can be used for checking the datatypes compilation time (and in e.g. VS Code source code writing/saving time)</a:t>
+            </a:r>
+          </a:p>
+        </p:txBody>
+      </p:sp>
+      <p:sp>
+        <p:nvSpPr>
+          <p:cNvPr id="5" name="Date Placeholder 4">
+            <a:extLst>
+              <a:ext uri="{FF2B5EF4-FFF2-40B4-BE49-F238E27FC236}">
+                <a16:creationId xmlns:a16="http://schemas.microsoft.com/office/drawing/2014/main" id="{3E81E37E-7033-9C16-8068-CECF076458FD}"/>
+              </a:ext>
+            </a:extLst>
+          </p:cNvPr>
+          <p:cNvSpPr>
+            <a:spLocks noGrp="1"/>
+          </p:cNvSpPr>
+          <p:nvPr>
+            <p:ph type="dt" sz="half" idx="10"/>
+          </p:nvPr>
+        </p:nvSpPr>
+        <p:spPr/>
+        <p:txBody>
+          <a:bodyPr/>
+          <a:lstStyle/>
+          <a:p>
+            <a:fld id="{202E1EC2-47B8-044B-A09E-6A63B4D80C87}" type="datetime1">
+              <a:rPr lang="fi-FI" smtClean="0"/>
+              <a:t>10.2.2025</a:t>
+            </a:fld>
+            <a:endParaRPr lang="en-GB"/>
+          </a:p>
+        </p:txBody>
+      </p:sp>
+      <p:sp>
+        <p:nvSpPr>
+          <p:cNvPr id="6" name="Footer Placeholder 5">
+            <a:extLst>
+              <a:ext uri="{FF2B5EF4-FFF2-40B4-BE49-F238E27FC236}">
+                <a16:creationId xmlns:a16="http://schemas.microsoft.com/office/drawing/2014/main" id="{F99CFDE2-ECC3-2A7D-B79C-691239AF45FC}"/>
+              </a:ext>
+            </a:extLst>
+          </p:cNvPr>
+          <p:cNvSpPr>
+            <a:spLocks noGrp="1"/>
+          </p:cNvSpPr>
+          <p:nvPr>
+            <p:ph type="ftr" sz="quarter" idx="11"/>
+          </p:nvPr>
+        </p:nvSpPr>
+        <p:spPr/>
+        <p:txBody>
+          <a:bodyPr/>
+          <a:lstStyle/>
+          <a:p>
+            <a:endParaRPr lang="en-GB"/>
+          </a:p>
+        </p:txBody>
+      </p:sp>
+      <p:sp>
+        <p:nvSpPr>
+          <p:cNvPr id="7" name="Slide Number Placeholder 6">
+            <a:extLst>
+              <a:ext uri="{FF2B5EF4-FFF2-40B4-BE49-F238E27FC236}">
+                <a16:creationId xmlns:a16="http://schemas.microsoft.com/office/drawing/2014/main" id="{66CB6A31-D63D-31D7-B349-B6FEF78660F1}"/>
+              </a:ext>
+            </a:extLst>
+          </p:cNvPr>
+          <p:cNvSpPr>
+            <a:spLocks noGrp="1"/>
+          </p:cNvSpPr>
+          <p:nvPr>
+            <p:ph type="sldNum" sz="quarter" idx="12"/>
+          </p:nvPr>
+        </p:nvSpPr>
+        <p:spPr/>
+        <p:txBody>
+          <a:bodyPr/>
+          <a:lstStyle/>
+          <a:p>
+            <a:fld id="{76BAB7ED-EDE9-4D4B-9A2D-30E18C47C16E}" type="slidenum">
+              <a:rPr lang="en-GB" smtClean="0"/>
+              <a:t>13</a:t>
+            </a:fld>
+            <a:endParaRPr lang="en-GB"/>
+          </a:p>
+        </p:txBody>
+      </p:sp>
+    </p:spTree>
+    <p:extLst>
+      <p:ext uri="{BB962C8B-B14F-4D97-AF65-F5344CB8AC3E}">
+        <p14:creationId xmlns:p14="http://schemas.microsoft.com/office/powerpoint/2010/main" val="3518395336"/>
+      </p:ext>
+    </p:extLst>
+  </p:cSld>
+  <p:clrMapOvr>
+    <a:masterClrMapping/>
+  </p:clrMapOvr>
+</p:sld>
+</file>
+
+<file path=ppt/slides/slide14.xml><?xml version="1.0" encoding="utf-8"?>
+<p:sld xmlns:a="http://schemas.openxmlformats.org/drawingml/2006/main" xmlns:r="http://schemas.openxmlformats.org/officeDocument/2006/relationships" xmlns:p="http://schemas.openxmlformats.org/presentationml/2006/main">
+  <p:cSld>
+    <p:spTree>
+      <p:nvGrpSpPr>
         <p:cNvPr id="1" name=""/>
         <p:cNvGrpSpPr/>
         <p:nvPr/>
@@ -7359,7 +7741,7 @@
           <a:p>
             <a:fld id="{202E1EC2-47B8-044B-A09E-6A63B4D80C87}" type="datetime1">
               <a:rPr lang="fi-FI" smtClean="0"/>
-              <a:t>3.10.2024</a:t>
+              <a:t>10.2.2025</a:t>
             </a:fld>
             <a:endParaRPr lang="en-GB"/>
           </a:p>
@@ -7413,7 +7795,7 @@
           <a:p>
             <a:fld id="{76BAB7ED-EDE9-4D4B-9A2D-30E18C47C16E}" type="slidenum">
               <a:rPr lang="en-GB" smtClean="0"/>
-              <a:t>12</a:t>
+              <a:t>14</a:t>
             </a:fld>
             <a:endParaRPr lang="en-GB"/>
           </a:p>
@@ -9807,7 +10189,7 @@
 </p:sld>
 </file>
 
-<file path=ppt/slides/slide13.xml><?xml version="1.0" encoding="utf-8"?>
+<file path=ppt/slides/slide15.xml><?xml version="1.0" encoding="utf-8"?>
 <p:sld xmlns:a="http://schemas.openxmlformats.org/drawingml/2006/main" xmlns:r="http://schemas.openxmlformats.org/officeDocument/2006/relationships" xmlns:p="http://schemas.openxmlformats.org/presentationml/2006/main">
   <p:cSld>
     <p:spTree>
@@ -9888,7 +10270,7 @@
           <a:p>
             <a:fld id="{202E1EC2-47B8-044B-A09E-6A63B4D80C87}" type="datetime1">
               <a:rPr lang="fi-FI" smtClean="0"/>
-              <a:t>3.10.2024</a:t>
+              <a:t>10.2.2025</a:t>
             </a:fld>
             <a:endParaRPr lang="en-GB"/>
           </a:p>
@@ -9942,7 +10324,7 @@
           <a:p>
             <a:fld id="{76BAB7ED-EDE9-4D4B-9A2D-30E18C47C16E}" type="slidenum">
               <a:rPr lang="en-GB" smtClean="0"/>
-              <a:t>13</a:t>
+              <a:t>15</a:t>
             </a:fld>
             <a:endParaRPr lang="en-GB"/>
           </a:p>
@@ -11030,7 +11412,7 @@
 </p:sld>
 </file>
 
-<file path=ppt/slides/slide14.xml><?xml version="1.0" encoding="utf-8"?>
+<file path=ppt/slides/slide16.xml><?xml version="1.0" encoding="utf-8"?>
 <p:sld xmlns:a="http://schemas.openxmlformats.org/drawingml/2006/main" xmlns:r="http://schemas.openxmlformats.org/officeDocument/2006/relationships" xmlns:p="http://schemas.openxmlformats.org/presentationml/2006/main">
   <p:cSld>
     <p:spTree>
@@ -11113,7 +11495,7 @@
           <a:p>
             <a:r>
               <a:rPr lang="en-US" dirty="0"/>
-              <a:t>E.g. </a:t>
+              <a:t>Random command example: </a:t>
             </a:r>
           </a:p>
           <a:p>
@@ -11176,7 +11558,7 @@
           <a:p>
             <a:fld id="{202E1EC2-47B8-044B-A09E-6A63B4D80C87}" type="datetime1">
               <a:rPr lang="fi-FI" smtClean="0"/>
-              <a:t>3.10.2024</a:t>
+              <a:t>10.2.2025</a:t>
             </a:fld>
             <a:endParaRPr lang="en-GB"/>
           </a:p>
@@ -11230,7 +11612,7 @@
           <a:p>
             <a:fld id="{76BAB7ED-EDE9-4D4B-9A2D-30E18C47C16E}" type="slidenum">
               <a:rPr lang="en-GB" smtClean="0"/>
-              <a:t>14</a:t>
+              <a:t>16</a:t>
             </a:fld>
             <a:endParaRPr lang="en-GB"/>
           </a:p>
@@ -11249,7 +11631,7 @@
 </p:sld>
 </file>
 
-<file path=ppt/slides/slide15.xml><?xml version="1.0" encoding="utf-8"?>
+<file path=ppt/slides/slide17.xml><?xml version="1.0" encoding="utf-8"?>
 <p:sld xmlns:a="http://schemas.openxmlformats.org/drawingml/2006/main" xmlns:r="http://schemas.openxmlformats.org/officeDocument/2006/relationships" xmlns:p="http://schemas.openxmlformats.org/presentationml/2006/main">
   <p:cSld>
     <p:spTree>
@@ -11440,13 +11822,8 @@
             </a:r>
             <a:r>
               <a:rPr lang="en-US" dirty="0"/>
-              <a:t> for the running time </a:t>
-            </a:r>
-            <a:r>
-              <a:rPr lang="en-US"/>
-              <a:t>/ production.</a:t>
-            </a:r>
-            <a:endParaRPr lang="en-US" dirty="0"/>
+              <a:t> for the running time / production.</a:t>
+            </a:r>
           </a:p>
           <a:p>
             <a:endParaRPr lang="en-US" dirty="0"/>
@@ -11466,7 +11843,7 @@
             </a:r>
             <a:r>
               <a:rPr lang="en-US" dirty="0"/>
-              <a:t> for combining the compilation and running as one bit slower step)</a:t>
+              <a:t> for combining the compilation and running as a one, bit slower, step)</a:t>
             </a:r>
           </a:p>
         </p:txBody>
@@ -11494,7 +11871,7 @@
           <a:p>
             <a:fld id="{202E1EC2-47B8-044B-A09E-6A63B4D80C87}" type="datetime1">
               <a:rPr lang="fi-FI" smtClean="0"/>
-              <a:t>3.10.2024</a:t>
+              <a:t>10.2.2025</a:t>
             </a:fld>
             <a:endParaRPr lang="en-GB"/>
           </a:p>
@@ -11548,7 +11925,7 @@
           <a:p>
             <a:fld id="{76BAB7ED-EDE9-4D4B-9A2D-30E18C47C16E}" type="slidenum">
               <a:rPr lang="en-GB" smtClean="0"/>
-              <a:t>15</a:t>
+              <a:t>17</a:t>
             </a:fld>
             <a:endParaRPr lang="en-GB"/>
           </a:p>
@@ -11637,7 +12014,7 @@
           <a:p>
             <a:fld id="{202E1EC2-47B8-044B-A09E-6A63B4D80C87}" type="datetime1">
               <a:rPr lang="fi-FI" smtClean="0"/>
-              <a:t>3.10.2024</a:t>
+              <a:t>10.2.2025</a:t>
             </a:fld>
             <a:endParaRPr lang="en-GB"/>
           </a:p>
@@ -12136,7 +12513,7 @@
           <a:p>
             <a:fld id="{202E1EC2-47B8-044B-A09E-6A63B4D80C87}" type="datetime1">
               <a:rPr lang="fi-FI" smtClean="0"/>
-              <a:t>3.10.2024</a:t>
+              <a:t>10.2.2025</a:t>
             </a:fld>
             <a:endParaRPr lang="en-GB"/>
           </a:p>
@@ -12720,7 +13097,7 @@
               <a:rPr lang="en-US" dirty="0">
                 <a:latin typeface="Consolas" panose="020B0609020204030204" pitchFamily="49" charset="0"/>
               </a:rPr>
-              <a:t> --save -g typescript @types/node</a:t>
+              <a:t> typescript @types/node</a:t>
             </a:r>
           </a:p>
         </p:txBody>
@@ -12748,7 +13125,7 @@
           <a:p>
             <a:fld id="{202E1EC2-47B8-044B-A09E-6A63B4D80C87}" type="datetime1">
               <a:rPr lang="fi-FI" smtClean="0"/>
-              <a:t>3.10.2024</a:t>
+              <a:t>10.2.2025</a:t>
             </a:fld>
             <a:endParaRPr lang="en-GB"/>
           </a:p>
@@ -12926,7 +13303,7 @@
           <a:p>
             <a:fld id="{202E1EC2-47B8-044B-A09E-6A63B4D80C87}" type="datetime1">
               <a:rPr lang="fi-FI" smtClean="0"/>
-              <a:t>3.10.2024</a:t>
+              <a:t>10.2.2025</a:t>
             </a:fld>
             <a:endParaRPr lang="en-GB"/>
           </a:p>
@@ -13040,7 +13417,7 @@
             <a:pPr lvl="0"/>
             <a:r>
               <a:rPr lang="en-US" dirty="0"/>
-              <a:t>Initialize the (former JS?) project as TS project</a:t>
+              <a:t>Initialize the (JS or new) project as TS project</a:t>
             </a:r>
             <a:endParaRPr lang="fi-FI" dirty="0"/>
           </a:p>
@@ -13093,7 +13470,43 @@
               <a:rPr lang="en-US" dirty="0">
                 <a:latin typeface="Consolas" panose="020B0609020204030204" pitchFamily="49" charset="0"/>
               </a:rPr>
+              <a:t> --</a:t>
+            </a:r>
+            <a:r>
+              <a:rPr lang="en-US" dirty="0" err="1">
+                <a:latin typeface="Consolas" panose="020B0609020204030204" pitchFamily="49" charset="0"/>
+              </a:rPr>
+              <a:t>init</a:t>
+            </a:r>
+            <a:r>
+              <a:rPr lang="en-US" dirty="0">
+                <a:latin typeface="Consolas" panose="020B0609020204030204" pitchFamily="49" charset="0"/>
+              </a:rPr>
+              <a:t>      or  </a:t>
+            </a:r>
+            <a:r>
+              <a:rPr lang="en-US" dirty="0" err="1">
+                <a:latin typeface="Consolas" panose="020B0609020204030204" pitchFamily="49" charset="0"/>
+              </a:rPr>
+              <a:t>npx</a:t>
+            </a:r>
+            <a:r>
+              <a:rPr lang="en-US" dirty="0">
+                <a:latin typeface="Consolas" panose="020B0609020204030204" pitchFamily="49" charset="0"/>
+              </a:rPr>
               <a:t> </a:t>
+            </a:r>
+            <a:r>
+              <a:rPr lang="en-US" dirty="0" err="1">
+                <a:latin typeface="Consolas" panose="020B0609020204030204" pitchFamily="49" charset="0"/>
+              </a:rPr>
+              <a:t>tsc</a:t>
+            </a:r>
+            <a:r>
+              <a:rPr lang="en-US" dirty="0">
+                <a:latin typeface="Consolas" panose="020B0609020204030204" pitchFamily="49" charset="0"/>
+              </a:rPr>
+              <a:t> --</a:t>
             </a:r>
             <a:r>
               <a:rPr lang="en-US" dirty="0" err="1">
@@ -13116,8 +13529,154 @@
             </a:r>
             <a:r>
               <a:rPr lang="en-US" dirty="0"/>
-              <a:t> file to the project root</a:t>
-            </a:r>
+              <a:t> file to the project root. Example console output below from 2025:</a:t>
+            </a:r>
+          </a:p>
+          <a:p>
+            <a:endParaRPr lang="en-US" dirty="0"/>
+          </a:p>
+          <a:p>
+            <a:pPr marL="0" indent="0">
+              <a:buNone/>
+            </a:pPr>
+            <a:r>
+              <a:rPr lang="en-US" dirty="0">
+                <a:latin typeface="Consolas" panose="020B0609020204030204" pitchFamily="49" charset="0"/>
+              </a:rPr>
+              <a:t>Created a new </a:t>
+            </a:r>
+            <a:r>
+              <a:rPr lang="en-US" dirty="0" err="1">
+                <a:latin typeface="Consolas" panose="020B0609020204030204" pitchFamily="49" charset="0"/>
+              </a:rPr>
+              <a:t>tsconfig.json</a:t>
+            </a:r>
+            <a:r>
+              <a:rPr lang="en-US" dirty="0">
+                <a:latin typeface="Consolas" panose="020B0609020204030204" pitchFamily="49" charset="0"/>
+              </a:rPr>
+              <a:t> with:</a:t>
+            </a:r>
+          </a:p>
+          <a:p>
+            <a:pPr marL="0" indent="0">
+              <a:buNone/>
+            </a:pPr>
+            <a:r>
+              <a:rPr lang="en-US" dirty="0">
+                <a:latin typeface="Consolas" panose="020B0609020204030204" pitchFamily="49" charset="0"/>
+              </a:rPr>
+              <a:t>  target: es2016</a:t>
+            </a:r>
+          </a:p>
+          <a:p>
+            <a:pPr marL="0" indent="0">
+              <a:buNone/>
+            </a:pPr>
+            <a:r>
+              <a:rPr lang="en-US" dirty="0">
+                <a:latin typeface="Consolas" panose="020B0609020204030204" pitchFamily="49" charset="0"/>
+              </a:rPr>
+              <a:t>  module: </a:t>
+            </a:r>
+            <a:r>
+              <a:rPr lang="en-US" dirty="0" err="1">
+                <a:latin typeface="Consolas" panose="020B0609020204030204" pitchFamily="49" charset="0"/>
+              </a:rPr>
+              <a:t>commonjs</a:t>
+            </a:r>
+            <a:endParaRPr lang="en-US" dirty="0">
+              <a:latin typeface="Consolas" panose="020B0609020204030204" pitchFamily="49" charset="0"/>
+            </a:endParaRPr>
+          </a:p>
+          <a:p>
+            <a:pPr marL="0" indent="0">
+              <a:buNone/>
+            </a:pPr>
+            <a:r>
+              <a:rPr lang="en-US" dirty="0">
+                <a:latin typeface="Consolas" panose="020B0609020204030204" pitchFamily="49" charset="0"/>
+              </a:rPr>
+              <a:t>  strict: true</a:t>
+            </a:r>
+          </a:p>
+          <a:p>
+            <a:pPr marL="0" indent="0">
+              <a:buNone/>
+            </a:pPr>
+            <a:r>
+              <a:rPr lang="en-US" dirty="0">
+                <a:latin typeface="Consolas" panose="020B0609020204030204" pitchFamily="49" charset="0"/>
+              </a:rPr>
+              <a:t>  </a:t>
+            </a:r>
+            <a:r>
+              <a:rPr lang="en-US" dirty="0" err="1">
+                <a:latin typeface="Consolas" panose="020B0609020204030204" pitchFamily="49" charset="0"/>
+              </a:rPr>
+              <a:t>esModuleInterop</a:t>
+            </a:r>
+            <a:r>
+              <a:rPr lang="en-US" dirty="0">
+                <a:latin typeface="Consolas" panose="020B0609020204030204" pitchFamily="49" charset="0"/>
+              </a:rPr>
+              <a:t>: true</a:t>
+            </a:r>
+          </a:p>
+          <a:p>
+            <a:pPr marL="0" indent="0">
+              <a:buNone/>
+            </a:pPr>
+            <a:r>
+              <a:rPr lang="en-US" dirty="0">
+                <a:latin typeface="Consolas" panose="020B0609020204030204" pitchFamily="49" charset="0"/>
+              </a:rPr>
+              <a:t>  </a:t>
+            </a:r>
+            <a:r>
+              <a:rPr lang="en-US" dirty="0" err="1">
+                <a:latin typeface="Consolas" panose="020B0609020204030204" pitchFamily="49" charset="0"/>
+              </a:rPr>
+              <a:t>skipLibCheck</a:t>
+            </a:r>
+            <a:r>
+              <a:rPr lang="en-US" dirty="0">
+                <a:latin typeface="Consolas" panose="020B0609020204030204" pitchFamily="49" charset="0"/>
+              </a:rPr>
+              <a:t>: true</a:t>
+            </a:r>
+          </a:p>
+          <a:p>
+            <a:pPr marL="0" indent="0">
+              <a:buNone/>
+            </a:pPr>
+            <a:r>
+              <a:rPr lang="en-US" dirty="0">
+                <a:latin typeface="Consolas" panose="020B0609020204030204" pitchFamily="49" charset="0"/>
+              </a:rPr>
+              <a:t>  </a:t>
+            </a:r>
+            <a:r>
+              <a:rPr lang="en-US" dirty="0" err="1">
+                <a:latin typeface="Consolas" panose="020B0609020204030204" pitchFamily="49" charset="0"/>
+              </a:rPr>
+              <a:t>forceConsistentCasingInFileNames</a:t>
+            </a:r>
+            <a:r>
+              <a:rPr lang="en-US" dirty="0">
+                <a:latin typeface="Consolas" panose="020B0609020204030204" pitchFamily="49" charset="0"/>
+              </a:rPr>
+              <a:t>: true</a:t>
+            </a:r>
+          </a:p>
+          <a:p>
+            <a:endParaRPr lang="en-US" dirty="0"/>
+          </a:p>
+          <a:p>
+            <a:pPr marL="0" indent="0">
+              <a:buNone/>
+            </a:pPr>
+            <a:endParaRPr lang="en-US" dirty="0"/>
           </a:p>
         </p:txBody>
       </p:sp>
@@ -13144,7 +13703,7 @@
           <a:p>
             <a:fld id="{202E1EC2-47B8-044B-A09E-6A63B4D80C87}" type="datetime1">
               <a:rPr lang="fi-FI" smtClean="0"/>
-              <a:t>3.10.2024</a:t>
+              <a:t>10.2.2025</a:t>
             </a:fld>
             <a:endParaRPr lang="en-GB"/>
           </a:p>
@@ -13398,7 +13957,7 @@
           <a:p>
             <a:fld id="{202E1EC2-47B8-044B-A09E-6A63B4D80C87}" type="datetime1">
               <a:rPr lang="fi-FI" smtClean="0"/>
-              <a:t>3.10.2024</a:t>
+              <a:t>10.2.2025</a:t>
             </a:fld>
             <a:endParaRPr lang="en-GB"/>
           </a:p>
@@ -13724,7 +14283,7 @@
           <a:p>
             <a:fld id="{202E1EC2-47B8-044B-A09E-6A63B4D80C87}" type="datetime1">
               <a:rPr lang="fi-FI" smtClean="0"/>
-              <a:t>3.10.2024</a:t>
+              <a:t>10.2.2025</a:t>
             </a:fld>
             <a:endParaRPr lang="en-GB"/>
           </a:p>
@@ -13960,7 +14519,7 @@
           <a:p>
             <a:fld id="{202E1EC2-47B8-044B-A09E-6A63B4D80C87}" type="datetime1">
               <a:rPr lang="fi-FI" smtClean="0"/>
-              <a:t>3.10.2024</a:t>
+              <a:t>10.2.2025</a:t>
             </a:fld>
             <a:endParaRPr lang="en-GB"/>
           </a:p>

</xml_diff>